<commit_message>
Update slide 4 of GitHub presentation
</commit_message>
<xml_diff>
--- a/content/presentations/GitHub.pptx
+++ b/content/presentations/GitHub.pptx
@@ -108,6 +108,11 @@
       </a:defRPr>
     </a:lvl9pPr>
   </p:defaultTextStyle>
+  <p:extLst>
+    <p:ext uri="{EFAFB233-063F-42B5-8137-9DF3F51BA10A}">
+      <p15:sldGuideLst xmlns:p15="http://schemas.microsoft.com/office/powerpoint/2012/main"/>
+    </p:ext>
+  </p:extLst>
 </p:presentation>
 </file>
 
@@ -258,7 +263,7 @@
           <a:p>
             <a:fld id="{79FC4770-8ED6-4142-851D-993D6231324F}" type="datetimeFigureOut">
               <a:rPr lang="en-US" smtClean="0"/>
-              <a:t>8/11/2023</a:t>
+              <a:t>8/15/2023</a:t>
             </a:fld>
             <a:endParaRPr lang="en-US"/>
           </a:p>
@@ -456,7 +461,7 @@
           <a:p>
             <a:fld id="{79FC4770-8ED6-4142-851D-993D6231324F}" type="datetimeFigureOut">
               <a:rPr lang="en-US" smtClean="0"/>
-              <a:t>8/11/2023</a:t>
+              <a:t>8/15/2023</a:t>
             </a:fld>
             <a:endParaRPr lang="en-US"/>
           </a:p>
@@ -664,7 +669,7 @@
           <a:p>
             <a:fld id="{79FC4770-8ED6-4142-851D-993D6231324F}" type="datetimeFigureOut">
               <a:rPr lang="en-US" smtClean="0"/>
-              <a:t>8/11/2023</a:t>
+              <a:t>8/15/2023</a:t>
             </a:fld>
             <a:endParaRPr lang="en-US"/>
           </a:p>
@@ -862,7 +867,7 @@
           <a:p>
             <a:fld id="{79FC4770-8ED6-4142-851D-993D6231324F}" type="datetimeFigureOut">
               <a:rPr lang="en-US" smtClean="0"/>
-              <a:t>8/11/2023</a:t>
+              <a:t>8/15/2023</a:t>
             </a:fld>
             <a:endParaRPr lang="en-US"/>
           </a:p>
@@ -1137,7 +1142,7 @@
           <a:p>
             <a:fld id="{79FC4770-8ED6-4142-851D-993D6231324F}" type="datetimeFigureOut">
               <a:rPr lang="en-US" smtClean="0"/>
-              <a:t>8/11/2023</a:t>
+              <a:t>8/15/2023</a:t>
             </a:fld>
             <a:endParaRPr lang="en-US"/>
           </a:p>
@@ -1402,7 +1407,7 @@
           <a:p>
             <a:fld id="{79FC4770-8ED6-4142-851D-993D6231324F}" type="datetimeFigureOut">
               <a:rPr lang="en-US" smtClean="0"/>
-              <a:t>8/11/2023</a:t>
+              <a:t>8/15/2023</a:t>
             </a:fld>
             <a:endParaRPr lang="en-US"/>
           </a:p>
@@ -1814,7 +1819,7 @@
           <a:p>
             <a:fld id="{79FC4770-8ED6-4142-851D-993D6231324F}" type="datetimeFigureOut">
               <a:rPr lang="en-US" smtClean="0"/>
-              <a:t>8/11/2023</a:t>
+              <a:t>8/15/2023</a:t>
             </a:fld>
             <a:endParaRPr lang="en-US"/>
           </a:p>
@@ -1955,7 +1960,7 @@
           <a:p>
             <a:fld id="{79FC4770-8ED6-4142-851D-993D6231324F}" type="datetimeFigureOut">
               <a:rPr lang="en-US" smtClean="0"/>
-              <a:t>8/11/2023</a:t>
+              <a:t>8/15/2023</a:t>
             </a:fld>
             <a:endParaRPr lang="en-US"/>
           </a:p>
@@ -2068,7 +2073,7 @@
           <a:p>
             <a:fld id="{79FC4770-8ED6-4142-851D-993D6231324F}" type="datetimeFigureOut">
               <a:rPr lang="en-US" smtClean="0"/>
-              <a:t>8/11/2023</a:t>
+              <a:t>8/15/2023</a:t>
             </a:fld>
             <a:endParaRPr lang="en-US"/>
           </a:p>
@@ -2379,7 +2384,7 @@
           <a:p>
             <a:fld id="{79FC4770-8ED6-4142-851D-993D6231324F}" type="datetimeFigureOut">
               <a:rPr lang="en-US" smtClean="0"/>
-              <a:t>8/11/2023</a:t>
+              <a:t>8/15/2023</a:t>
             </a:fld>
             <a:endParaRPr lang="en-US"/>
           </a:p>
@@ -2667,7 +2672,7 @@
           <a:p>
             <a:fld id="{79FC4770-8ED6-4142-851D-993D6231324F}" type="datetimeFigureOut">
               <a:rPr lang="en-US" smtClean="0"/>
-              <a:t>8/11/2023</a:t>
+              <a:t>8/15/2023</a:t>
             </a:fld>
             <a:endParaRPr lang="en-US"/>
           </a:p>
@@ -2908,7 +2913,7 @@
           <a:p>
             <a:fld id="{79FC4770-8ED6-4142-851D-993D6231324F}" type="datetimeFigureOut">
               <a:rPr lang="en-US" smtClean="0"/>
-              <a:t>8/11/2023</a:t>
+              <a:t>8/15/2023</a:t>
             </a:fld>
             <a:endParaRPr lang="en-US"/>
           </a:p>
@@ -5297,15 +5302,15 @@
       </p:sp>
       <p:pic>
         <p:nvPicPr>
-          <p:cNvPr id="2052" name="Picture 4" descr="Blog GitHub workflow">
-            <a:extLst>
-              <a:ext uri="{FF2B5EF4-FFF2-40B4-BE49-F238E27FC236}">
-                <a16:creationId xmlns:a16="http://schemas.microsoft.com/office/drawing/2014/main" id="{73B4FF59-059D-51B8-15B5-4ACA46E6D499}"/>
+          <p:cNvPr id="4" name="Picture 3" descr="A diagram of a github&#10;&#10;Description automatically generated">
+            <a:extLst>
+              <a:ext uri="{FF2B5EF4-FFF2-40B4-BE49-F238E27FC236}">
+                <a16:creationId xmlns:a16="http://schemas.microsoft.com/office/drawing/2014/main" id="{B65D4F9B-C214-95EF-B06C-3EF5B6FA54C7}"/>
               </a:ext>
             </a:extLst>
           </p:cNvPr>
           <p:cNvPicPr>
-            <a:picLocks noChangeAspect="1" noChangeArrowheads="1"/>
+            <a:picLocks noChangeAspect="1"/>
           </p:cNvPicPr>
           <p:nvPr/>
         </p:nvPicPr>
@@ -5321,24 +5326,14 @@
             <a:fillRect/>
           </a:stretch>
         </p:blipFill>
-        <p:spPr bwMode="auto">
+        <p:spPr>
           <a:xfrm>
-            <a:off x="5922492" y="1212904"/>
-            <a:ext cx="5536001" cy="4373439"/>
+            <a:off x="5880923" y="1136306"/>
+            <a:ext cx="5529870" cy="4370832"/>
           </a:xfrm>
           <a:prstGeom prst="rect">
             <a:avLst/>
           </a:prstGeom>
-          <a:noFill/>
-          <a:extLst>
-            <a:ext uri="{909E8E84-426E-40DD-AFC4-6F175D3DCCD1}">
-              <a14:hiddenFill xmlns:a14="http://schemas.microsoft.com/office/drawing/2010/main">
-                <a:solidFill>
-                  <a:srgbClr val="FFFFFF"/>
-                </a:solidFill>
-              </a14:hiddenFill>
-            </a:ext>
-          </a:extLst>
         </p:spPr>
       </p:pic>
     </p:spTree>

</xml_diff>

<commit_message>
Update slide 4 of GitHub presentation (#22)
* fix updateable help

* Update slide 4 of GitHub presentation
</commit_message>
<xml_diff>
--- a/content/presentations/GitHub.pptx
+++ b/content/presentations/GitHub.pptx
@@ -108,6 +108,11 @@
       </a:defRPr>
     </a:lvl9pPr>
   </p:defaultTextStyle>
+  <p:extLst>
+    <p:ext uri="{EFAFB233-063F-42B5-8137-9DF3F51BA10A}">
+      <p15:sldGuideLst xmlns:p15="http://schemas.microsoft.com/office/powerpoint/2012/main"/>
+    </p:ext>
+  </p:extLst>
 </p:presentation>
 </file>
 
@@ -258,7 +263,7 @@
           <a:p>
             <a:fld id="{79FC4770-8ED6-4142-851D-993D6231324F}" type="datetimeFigureOut">
               <a:rPr lang="en-US" smtClean="0"/>
-              <a:t>8/11/2023</a:t>
+              <a:t>8/15/2023</a:t>
             </a:fld>
             <a:endParaRPr lang="en-US"/>
           </a:p>
@@ -456,7 +461,7 @@
           <a:p>
             <a:fld id="{79FC4770-8ED6-4142-851D-993D6231324F}" type="datetimeFigureOut">
               <a:rPr lang="en-US" smtClean="0"/>
-              <a:t>8/11/2023</a:t>
+              <a:t>8/15/2023</a:t>
             </a:fld>
             <a:endParaRPr lang="en-US"/>
           </a:p>
@@ -664,7 +669,7 @@
           <a:p>
             <a:fld id="{79FC4770-8ED6-4142-851D-993D6231324F}" type="datetimeFigureOut">
               <a:rPr lang="en-US" smtClean="0"/>
-              <a:t>8/11/2023</a:t>
+              <a:t>8/15/2023</a:t>
             </a:fld>
             <a:endParaRPr lang="en-US"/>
           </a:p>
@@ -862,7 +867,7 @@
           <a:p>
             <a:fld id="{79FC4770-8ED6-4142-851D-993D6231324F}" type="datetimeFigureOut">
               <a:rPr lang="en-US" smtClean="0"/>
-              <a:t>8/11/2023</a:t>
+              <a:t>8/15/2023</a:t>
             </a:fld>
             <a:endParaRPr lang="en-US"/>
           </a:p>
@@ -1137,7 +1142,7 @@
           <a:p>
             <a:fld id="{79FC4770-8ED6-4142-851D-993D6231324F}" type="datetimeFigureOut">
               <a:rPr lang="en-US" smtClean="0"/>
-              <a:t>8/11/2023</a:t>
+              <a:t>8/15/2023</a:t>
             </a:fld>
             <a:endParaRPr lang="en-US"/>
           </a:p>
@@ -1402,7 +1407,7 @@
           <a:p>
             <a:fld id="{79FC4770-8ED6-4142-851D-993D6231324F}" type="datetimeFigureOut">
               <a:rPr lang="en-US" smtClean="0"/>
-              <a:t>8/11/2023</a:t>
+              <a:t>8/15/2023</a:t>
             </a:fld>
             <a:endParaRPr lang="en-US"/>
           </a:p>
@@ -1814,7 +1819,7 @@
           <a:p>
             <a:fld id="{79FC4770-8ED6-4142-851D-993D6231324F}" type="datetimeFigureOut">
               <a:rPr lang="en-US" smtClean="0"/>
-              <a:t>8/11/2023</a:t>
+              <a:t>8/15/2023</a:t>
             </a:fld>
             <a:endParaRPr lang="en-US"/>
           </a:p>
@@ -1955,7 +1960,7 @@
           <a:p>
             <a:fld id="{79FC4770-8ED6-4142-851D-993D6231324F}" type="datetimeFigureOut">
               <a:rPr lang="en-US" smtClean="0"/>
-              <a:t>8/11/2023</a:t>
+              <a:t>8/15/2023</a:t>
             </a:fld>
             <a:endParaRPr lang="en-US"/>
           </a:p>
@@ -2068,7 +2073,7 @@
           <a:p>
             <a:fld id="{79FC4770-8ED6-4142-851D-993D6231324F}" type="datetimeFigureOut">
               <a:rPr lang="en-US" smtClean="0"/>
-              <a:t>8/11/2023</a:t>
+              <a:t>8/15/2023</a:t>
             </a:fld>
             <a:endParaRPr lang="en-US"/>
           </a:p>
@@ -2379,7 +2384,7 @@
           <a:p>
             <a:fld id="{79FC4770-8ED6-4142-851D-993D6231324F}" type="datetimeFigureOut">
               <a:rPr lang="en-US" smtClean="0"/>
-              <a:t>8/11/2023</a:t>
+              <a:t>8/15/2023</a:t>
             </a:fld>
             <a:endParaRPr lang="en-US"/>
           </a:p>
@@ -2667,7 +2672,7 @@
           <a:p>
             <a:fld id="{79FC4770-8ED6-4142-851D-993D6231324F}" type="datetimeFigureOut">
               <a:rPr lang="en-US" smtClean="0"/>
-              <a:t>8/11/2023</a:t>
+              <a:t>8/15/2023</a:t>
             </a:fld>
             <a:endParaRPr lang="en-US"/>
           </a:p>
@@ -2908,7 +2913,7 @@
           <a:p>
             <a:fld id="{79FC4770-8ED6-4142-851D-993D6231324F}" type="datetimeFigureOut">
               <a:rPr lang="en-US" smtClean="0"/>
-              <a:t>8/11/2023</a:t>
+              <a:t>8/15/2023</a:t>
             </a:fld>
             <a:endParaRPr lang="en-US"/>
           </a:p>
@@ -5297,15 +5302,15 @@
       </p:sp>
       <p:pic>
         <p:nvPicPr>
-          <p:cNvPr id="2052" name="Picture 4" descr="Blog GitHub workflow">
-            <a:extLst>
-              <a:ext uri="{FF2B5EF4-FFF2-40B4-BE49-F238E27FC236}">
-                <a16:creationId xmlns:a16="http://schemas.microsoft.com/office/drawing/2014/main" id="{73B4FF59-059D-51B8-15B5-4ACA46E6D499}"/>
+          <p:cNvPr id="4" name="Picture 3" descr="A diagram of a github&#10;&#10;Description automatically generated">
+            <a:extLst>
+              <a:ext uri="{FF2B5EF4-FFF2-40B4-BE49-F238E27FC236}">
+                <a16:creationId xmlns:a16="http://schemas.microsoft.com/office/drawing/2014/main" id="{B65D4F9B-C214-95EF-B06C-3EF5B6FA54C7}"/>
               </a:ext>
             </a:extLst>
           </p:cNvPr>
           <p:cNvPicPr>
-            <a:picLocks noChangeAspect="1" noChangeArrowheads="1"/>
+            <a:picLocks noChangeAspect="1"/>
           </p:cNvPicPr>
           <p:nvPr/>
         </p:nvPicPr>
@@ -5321,24 +5326,14 @@
             <a:fillRect/>
           </a:stretch>
         </p:blipFill>
-        <p:spPr bwMode="auto">
+        <p:spPr>
           <a:xfrm>
-            <a:off x="5922492" y="1212904"/>
-            <a:ext cx="5536001" cy="4373439"/>
+            <a:off x="5880923" y="1136306"/>
+            <a:ext cx="5529870" cy="4370832"/>
           </a:xfrm>
           <a:prstGeom prst="rect">
             <a:avLst/>
           </a:prstGeom>
-          <a:noFill/>
-          <a:extLst>
-            <a:ext uri="{909E8E84-426E-40DD-AFC4-6F175D3DCCD1}">
-              <a14:hiddenFill xmlns:a14="http://schemas.microsoft.com/office/drawing/2010/main">
-                <a:solidFill>
-                  <a:srgbClr val="FFFFFF"/>
-                </a:solidFill>
-              </a14:hiddenFill>
-            </a:ext>
-          </a:extLst>
         </p:spPr>
       </p:pic>
     </p:spTree>

</xml_diff>